<commit_message>
revue rapport et presentation
</commit_message>
<xml_diff>
--- a/Doc/Presentation_projet_robot.pptx
+++ b/Doc/Presentation_projet_robot.pptx
@@ -6419,7 +6419,7 @@
           <p:cNvPr id="8" name="Titre 7">
             <a:extLst>
               <a:ext uri="{FF2B5EF4-FFF2-40B4-BE49-F238E27FC236}">
-                <a16:creationId xmlns="" xmlns:a16="http://schemas.microsoft.com/office/drawing/2014/main" id="{1E0FBD21-9589-482F-B553-8C5A73575CF7}"/>
+                <a16:creationId xmlns:a16="http://schemas.microsoft.com/office/drawing/2014/main" xmlns="" id="{1E0FBD21-9589-482F-B553-8C5A73575CF7}"/>
               </a:ext>
             </a:extLst>
           </p:cNvPr>
@@ -6455,7 +6455,7 @@
           <p:cNvPr id="11" name="Espace réservé du contenu 10">
             <a:extLst>
               <a:ext uri="{FF2B5EF4-FFF2-40B4-BE49-F238E27FC236}">
-                <a16:creationId xmlns="" xmlns:a16="http://schemas.microsoft.com/office/drawing/2014/main" id="{E09EC566-6182-4275-8F16-3AAE507B9DB4}"/>
+                <a16:creationId xmlns:a16="http://schemas.microsoft.com/office/drawing/2014/main" xmlns="" id="{E09EC566-6182-4275-8F16-3AAE507B9DB4}"/>
               </a:ext>
             </a:extLst>
           </p:cNvPr>
@@ -6490,7 +6490,7 @@
           <p:cNvPr id="2" name="Espace réservé du numéro de diapositive 1">
             <a:extLst>
               <a:ext uri="{FF2B5EF4-FFF2-40B4-BE49-F238E27FC236}">
-                <a16:creationId xmlns="" xmlns:a16="http://schemas.microsoft.com/office/drawing/2014/main" id="{2001229F-4560-4F26-A715-F83BA5915AFD}"/>
+                <a16:creationId xmlns:a16="http://schemas.microsoft.com/office/drawing/2014/main" xmlns="" id="{2001229F-4560-4F26-A715-F83BA5915AFD}"/>
               </a:ext>
             </a:extLst>
           </p:cNvPr>
@@ -6519,7 +6519,7 @@
           <p:cNvPr id="5" name="Image 4" descr="Une image contenant texte&#10;&#10;Description générée automatiquement">
             <a:extLst>
               <a:ext uri="{FF2B5EF4-FFF2-40B4-BE49-F238E27FC236}">
-                <a16:creationId xmlns="" xmlns:a16="http://schemas.microsoft.com/office/drawing/2014/main" id="{FD25BBEE-2A23-44E8-88BA-AA5E6ED77661}"/>
+                <a16:creationId xmlns:a16="http://schemas.microsoft.com/office/drawing/2014/main" xmlns="" id="{FD25BBEE-2A23-44E8-88BA-AA5E6ED77661}"/>
               </a:ext>
             </a:extLst>
           </p:cNvPr>
@@ -6555,7 +6555,7 @@
           <p:cNvPr id="7" name="Image 6">
             <a:extLst>
               <a:ext uri="{FF2B5EF4-FFF2-40B4-BE49-F238E27FC236}">
-                <a16:creationId xmlns="" xmlns:a16="http://schemas.microsoft.com/office/drawing/2014/main" id="{F1B8FCDB-B005-41F5-B5C7-B097D076696D}"/>
+                <a16:creationId xmlns:a16="http://schemas.microsoft.com/office/drawing/2014/main" xmlns="" id="{F1B8FCDB-B005-41F5-B5C7-B097D076696D}"/>
               </a:ext>
             </a:extLst>
           </p:cNvPr>
@@ -6591,7 +6591,7 @@
           <p:cNvPr id="9" name="ZoneTexte 8">
             <a:extLst>
               <a:ext uri="{FF2B5EF4-FFF2-40B4-BE49-F238E27FC236}">
-                <a16:creationId xmlns="" xmlns:a16="http://schemas.microsoft.com/office/drawing/2014/main" id="{1A6CBBCF-5EFA-4406-AE80-3E014B6C5773}"/>
+                <a16:creationId xmlns:a16="http://schemas.microsoft.com/office/drawing/2014/main" xmlns="" id="{1A6CBBCF-5EFA-4406-AE80-3E014B6C5773}"/>
               </a:ext>
             </a:extLst>
           </p:cNvPr>
@@ -6638,7 +6638,7 @@
           <p:cNvPr id="13" name="Image 12" descr="Une image contenant texte&#10;&#10;Description générée automatiquement">
             <a:extLst>
               <a:ext uri="{FF2B5EF4-FFF2-40B4-BE49-F238E27FC236}">
-                <a16:creationId xmlns="" xmlns:a16="http://schemas.microsoft.com/office/drawing/2014/main" id="{5EF2E5DA-148E-4904-9C30-95D91C29B423}"/>
+                <a16:creationId xmlns:a16="http://schemas.microsoft.com/office/drawing/2014/main" xmlns="" id="{5EF2E5DA-148E-4904-9C30-95D91C29B423}"/>
               </a:ext>
             </a:extLst>
           </p:cNvPr>
@@ -6679,6 +6679,13 @@
   <p:clrMapOvr>
     <a:masterClrMapping/>
   </p:clrMapOvr>
+  <p:timing>
+    <p:tnLst>
+      <p:par>
+        <p:cTn id="1" dur="indefinite" restart="never" nodeType="tmRoot"/>
+      </p:par>
+    </p:tnLst>
+  </p:timing>
 </p:sld>
 </file>
 
@@ -6704,7 +6711,7 @@
           <p:cNvPr id="3" name="Espace réservé du contenu 2">
             <a:extLst>
               <a:ext uri="{FF2B5EF4-FFF2-40B4-BE49-F238E27FC236}">
-                <a16:creationId xmlns="" xmlns:a16="http://schemas.microsoft.com/office/drawing/2014/main" id="{B05D650F-B3AB-4FFE-A224-A2C0DA42AD5B}"/>
+                <a16:creationId xmlns:a16="http://schemas.microsoft.com/office/drawing/2014/main" xmlns="" id="{B05D650F-B3AB-4FFE-A224-A2C0DA42AD5B}"/>
               </a:ext>
             </a:extLst>
           </p:cNvPr>
@@ -6746,7 +6753,7 @@
           <p:cNvPr id="4" name="Espace réservé du numéro de diapositive 3">
             <a:extLst>
               <a:ext uri="{FF2B5EF4-FFF2-40B4-BE49-F238E27FC236}">
-                <a16:creationId xmlns="" xmlns:a16="http://schemas.microsoft.com/office/drawing/2014/main" id="{840ED7A4-AA72-4E93-BBDA-8C2ADC2B4C35}"/>
+                <a16:creationId xmlns:a16="http://schemas.microsoft.com/office/drawing/2014/main" xmlns="" id="{840ED7A4-AA72-4E93-BBDA-8C2ADC2B4C35}"/>
               </a:ext>
             </a:extLst>
           </p:cNvPr>
@@ -6779,6 +6786,13 @@
   <p:clrMapOvr>
     <a:masterClrMapping/>
   </p:clrMapOvr>
+  <p:timing>
+    <p:tnLst>
+      <p:par>
+        <p:cTn id="1" dur="indefinite" restart="never" nodeType="tmRoot"/>
+      </p:par>
+    </p:tnLst>
+  </p:timing>
 </p:sld>
 </file>
 
@@ -6829,7 +6843,7 @@
           <p:cNvPr id="2" name="Titre 1">
             <a:extLst>
               <a:ext uri="{FF2B5EF4-FFF2-40B4-BE49-F238E27FC236}">
-                <a16:creationId xmlns="" xmlns:a16="http://schemas.microsoft.com/office/drawing/2014/main" id="{B10C7138-8451-4B69-A7C8-063D44BF58DD}"/>
+                <a16:creationId xmlns:a16="http://schemas.microsoft.com/office/drawing/2014/main" xmlns="" id="{B10C7138-8451-4B69-A7C8-063D44BF58DD}"/>
               </a:ext>
             </a:extLst>
           </p:cNvPr>
@@ -6865,7 +6879,7 @@
           <p:cNvPr id="3" name="Espace réservé du contenu 2">
             <a:extLst>
               <a:ext uri="{FF2B5EF4-FFF2-40B4-BE49-F238E27FC236}">
-                <a16:creationId xmlns="" xmlns:a16="http://schemas.microsoft.com/office/drawing/2014/main" id="{41FA56DC-66DB-4F0F-84A5-C52C0881876E}"/>
+                <a16:creationId xmlns:a16="http://schemas.microsoft.com/office/drawing/2014/main" xmlns="" id="{41FA56DC-66DB-4F0F-84A5-C52C0881876E}"/>
               </a:ext>
             </a:extLst>
           </p:cNvPr>
@@ -7038,7 +7052,7 @@
           <p:cNvPr id="4" name="Espace réservé du numéro de diapositive 3">
             <a:extLst>
               <a:ext uri="{FF2B5EF4-FFF2-40B4-BE49-F238E27FC236}">
-                <a16:creationId xmlns="" xmlns:a16="http://schemas.microsoft.com/office/drawing/2014/main" id="{B3E5788D-9166-4AA2-ADB9-EE43F8BBA9EA}"/>
+                <a16:creationId xmlns:a16="http://schemas.microsoft.com/office/drawing/2014/main" xmlns="" id="{B3E5788D-9166-4AA2-ADB9-EE43F8BBA9EA}"/>
               </a:ext>
             </a:extLst>
           </p:cNvPr>
@@ -7071,6 +7085,13 @@
   <p:clrMapOvr>
     <a:masterClrMapping/>
   </p:clrMapOvr>
+  <p:timing>
+    <p:tnLst>
+      <p:par>
+        <p:cTn id="1" dur="indefinite" restart="never" nodeType="tmRoot"/>
+      </p:par>
+    </p:tnLst>
+  </p:timing>
 </p:sld>
 </file>
 
@@ -7096,7 +7117,7 @@
           <p:cNvPr id="8" name="Titre 7">
             <a:extLst>
               <a:ext uri="{FF2B5EF4-FFF2-40B4-BE49-F238E27FC236}">
-                <a16:creationId xmlns="" xmlns:a16="http://schemas.microsoft.com/office/drawing/2014/main" id="{1E0FBD21-9589-482F-B553-8C5A73575CF7}"/>
+                <a16:creationId xmlns:a16="http://schemas.microsoft.com/office/drawing/2014/main" xmlns="" id="{1E0FBD21-9589-482F-B553-8C5A73575CF7}"/>
               </a:ext>
             </a:extLst>
           </p:cNvPr>
@@ -7132,7 +7153,7 @@
           <p:cNvPr id="9" name="Espace réservé du contenu 8">
             <a:extLst>
               <a:ext uri="{FF2B5EF4-FFF2-40B4-BE49-F238E27FC236}">
-                <a16:creationId xmlns="" xmlns:a16="http://schemas.microsoft.com/office/drawing/2014/main" id="{996D2E2F-5E1E-4447-AFF6-B8249A70593C}"/>
+                <a16:creationId xmlns:a16="http://schemas.microsoft.com/office/drawing/2014/main" xmlns="" id="{996D2E2F-5E1E-4447-AFF6-B8249A70593C}"/>
               </a:ext>
             </a:extLst>
           </p:cNvPr>
@@ -7333,7 +7354,7 @@
           <p:cNvPr id="2" name="Espace réservé du numéro de diapositive 1">
             <a:extLst>
               <a:ext uri="{FF2B5EF4-FFF2-40B4-BE49-F238E27FC236}">
-                <a16:creationId xmlns="" xmlns:a16="http://schemas.microsoft.com/office/drawing/2014/main" id="{2001229F-4560-4F26-A715-F83BA5915AFD}"/>
+                <a16:creationId xmlns:a16="http://schemas.microsoft.com/office/drawing/2014/main" xmlns="" id="{2001229F-4560-4F26-A715-F83BA5915AFD}"/>
               </a:ext>
             </a:extLst>
           </p:cNvPr>
@@ -7366,6 +7387,13 @@
   <p:clrMapOvr>
     <a:masterClrMapping/>
   </p:clrMapOvr>
+  <p:timing>
+    <p:tnLst>
+      <p:par>
+        <p:cTn id="1" dur="indefinite" restart="never" nodeType="tmRoot"/>
+      </p:par>
+    </p:tnLst>
+  </p:timing>
 </p:sld>
 </file>
 
@@ -7416,7 +7444,7 @@
           <p:cNvPr id="2" name="Titre 1">
             <a:extLst>
               <a:ext uri="{FF2B5EF4-FFF2-40B4-BE49-F238E27FC236}">
-                <a16:creationId xmlns="" xmlns:a16="http://schemas.microsoft.com/office/drawing/2014/main" id="{0CFD87AD-1074-4AF4-858C-AD4385D0FB52}"/>
+                <a16:creationId xmlns:a16="http://schemas.microsoft.com/office/drawing/2014/main" xmlns="" id="{0CFD87AD-1074-4AF4-858C-AD4385D0FB52}"/>
               </a:ext>
             </a:extLst>
           </p:cNvPr>
@@ -7455,7 +7483,7 @@
           <p:cNvPr id="4" name="Espace réservé du numéro de diapositive 3">
             <a:extLst>
               <a:ext uri="{FF2B5EF4-FFF2-40B4-BE49-F238E27FC236}">
-                <a16:creationId xmlns="" xmlns:a16="http://schemas.microsoft.com/office/drawing/2014/main" id="{66BAA2D7-FCEE-49F9-9229-951744FA5490}"/>
+                <a16:creationId xmlns:a16="http://schemas.microsoft.com/office/drawing/2014/main" xmlns="" id="{66BAA2D7-FCEE-49F9-9229-951744FA5490}"/>
               </a:ext>
             </a:extLst>
           </p:cNvPr>
@@ -7496,7 +7524,7 @@
           <p:cNvPr id="30" name="Image 29">
             <a:extLst>
               <a:ext uri="{FF2B5EF4-FFF2-40B4-BE49-F238E27FC236}">
-                <a16:creationId xmlns="" xmlns:a16="http://schemas.microsoft.com/office/drawing/2014/main" id="{4E288B30-FB48-484C-8B76-475386B2F82E}"/>
+                <a16:creationId xmlns:a16="http://schemas.microsoft.com/office/drawing/2014/main" xmlns="" id="{4E288B30-FB48-484C-8B76-475386B2F82E}"/>
               </a:ext>
             </a:extLst>
           </p:cNvPr>
@@ -7530,7 +7558,7 @@
           <p:cNvPr id="5" name="ZoneTexte 4">
             <a:extLst>
               <a:ext uri="{FF2B5EF4-FFF2-40B4-BE49-F238E27FC236}">
-                <a16:creationId xmlns="" xmlns:a16="http://schemas.microsoft.com/office/drawing/2014/main" id="{53AF8EEC-2C8A-4E5A-806E-C31512EC0D10}"/>
+                <a16:creationId xmlns:a16="http://schemas.microsoft.com/office/drawing/2014/main" xmlns="" id="{53AF8EEC-2C8A-4E5A-806E-C31512EC0D10}"/>
               </a:ext>
             </a:extLst>
           </p:cNvPr>
@@ -7680,6 +7708,13 @@
   <p:clrMapOvr>
     <a:masterClrMapping/>
   </p:clrMapOvr>
+  <p:timing>
+    <p:tnLst>
+      <p:par>
+        <p:cTn id="1" dur="indefinite" restart="never" nodeType="tmRoot"/>
+      </p:par>
+    </p:tnLst>
+  </p:timing>
 </p:sld>
 </file>
 
@@ -7785,6 +7820,13 @@
   <p:clrMapOvr>
     <a:masterClrMapping/>
   </p:clrMapOvr>
+  <p:timing>
+    <p:tnLst>
+      <p:par>
+        <p:cTn id="1" dur="indefinite" restart="never" nodeType="tmRoot"/>
+      </p:par>
+    </p:tnLst>
+  </p:timing>
 </p:sld>
 </file>
 
@@ -7810,7 +7852,7 @@
           <p:cNvPr id="2" name="Titre 1">
             <a:extLst>
               <a:ext uri="{FF2B5EF4-FFF2-40B4-BE49-F238E27FC236}">
-                <a16:creationId xmlns="" xmlns:a16="http://schemas.microsoft.com/office/drawing/2014/main" id="{B204B28C-3852-4777-9AB3-C5F54A0405D2}"/>
+                <a16:creationId xmlns:a16="http://schemas.microsoft.com/office/drawing/2014/main" xmlns="" id="{B204B28C-3852-4777-9AB3-C5F54A0405D2}"/>
               </a:ext>
             </a:extLst>
           </p:cNvPr>
@@ -7843,7 +7885,7 @@
           <p:cNvPr id="4" name="Espace réservé du numéro de diapositive 3">
             <a:extLst>
               <a:ext uri="{FF2B5EF4-FFF2-40B4-BE49-F238E27FC236}">
-                <a16:creationId xmlns="" xmlns:a16="http://schemas.microsoft.com/office/drawing/2014/main" id="{F860E774-F35D-4150-9CBC-BA971FF1B557}"/>
+                <a16:creationId xmlns:a16="http://schemas.microsoft.com/office/drawing/2014/main" xmlns="" id="{F860E774-F35D-4150-9CBC-BA971FF1B557}"/>
               </a:ext>
             </a:extLst>
           </p:cNvPr>
@@ -7871,7 +7913,7 @@
           <p:cNvPr id="11" name="Espace réservé du contenu 10">
             <a:extLst>
               <a:ext uri="{FF2B5EF4-FFF2-40B4-BE49-F238E27FC236}">
-                <a16:creationId xmlns="" xmlns:a16="http://schemas.microsoft.com/office/drawing/2014/main" id="{1A2A7B31-A787-43C2-9C01-6FB1722F9336}"/>
+                <a16:creationId xmlns:a16="http://schemas.microsoft.com/office/drawing/2014/main" xmlns="" id="{1A2A7B31-A787-43C2-9C01-6FB1722F9336}"/>
               </a:ext>
             </a:extLst>
           </p:cNvPr>
@@ -7918,7 +7960,7 @@
           <p:cNvPr id="13" name="Rectangle 12">
             <a:extLst>
               <a:ext uri="{FF2B5EF4-FFF2-40B4-BE49-F238E27FC236}">
-                <a16:creationId xmlns="" xmlns:a16="http://schemas.microsoft.com/office/drawing/2014/main" id="{1816C2B0-7ACE-4267-99FD-9A0202893CBB}"/>
+                <a16:creationId xmlns:a16="http://schemas.microsoft.com/office/drawing/2014/main" xmlns="" id="{1816C2B0-7ACE-4267-99FD-9A0202893CBB}"/>
               </a:ext>
             </a:extLst>
           </p:cNvPr>
@@ -7970,7 +8012,7 @@
           <p:cNvPr id="14" name="Rectangle 13">
             <a:extLst>
               <a:ext uri="{FF2B5EF4-FFF2-40B4-BE49-F238E27FC236}">
-                <a16:creationId xmlns="" xmlns:a16="http://schemas.microsoft.com/office/drawing/2014/main" id="{EFF69F74-6C52-469E-A211-82D6B188D0CE}"/>
+                <a16:creationId xmlns:a16="http://schemas.microsoft.com/office/drawing/2014/main" xmlns="" id="{EFF69F74-6C52-469E-A211-82D6B188D0CE}"/>
               </a:ext>
             </a:extLst>
           </p:cNvPr>
@@ -8022,7 +8064,7 @@
           <p:cNvPr id="15" name="Rectangle 14">
             <a:extLst>
               <a:ext uri="{FF2B5EF4-FFF2-40B4-BE49-F238E27FC236}">
-                <a16:creationId xmlns="" xmlns:a16="http://schemas.microsoft.com/office/drawing/2014/main" id="{F8309B39-4A77-4A69-B0D3-BFD54B9A3A1A}"/>
+                <a16:creationId xmlns:a16="http://schemas.microsoft.com/office/drawing/2014/main" xmlns="" id="{F8309B39-4A77-4A69-B0D3-BFD54B9A3A1A}"/>
               </a:ext>
             </a:extLst>
           </p:cNvPr>
@@ -8074,7 +8116,7 @@
           <p:cNvPr id="16" name="Rectangle 15">
             <a:extLst>
               <a:ext uri="{FF2B5EF4-FFF2-40B4-BE49-F238E27FC236}">
-                <a16:creationId xmlns="" xmlns:a16="http://schemas.microsoft.com/office/drawing/2014/main" id="{CC0163B1-8DAD-4EA3-984E-0D6852D4298D}"/>
+                <a16:creationId xmlns:a16="http://schemas.microsoft.com/office/drawing/2014/main" xmlns="" id="{CC0163B1-8DAD-4EA3-984E-0D6852D4298D}"/>
               </a:ext>
             </a:extLst>
           </p:cNvPr>
@@ -8126,7 +8168,7 @@
           <p:cNvPr id="17" name="Rectangle 16">
             <a:extLst>
               <a:ext uri="{FF2B5EF4-FFF2-40B4-BE49-F238E27FC236}">
-                <a16:creationId xmlns="" xmlns:a16="http://schemas.microsoft.com/office/drawing/2014/main" id="{2551820C-C1C8-4A9D-B7A9-C88E2841A2DB}"/>
+                <a16:creationId xmlns:a16="http://schemas.microsoft.com/office/drawing/2014/main" xmlns="" id="{2551820C-C1C8-4A9D-B7A9-C88E2841A2DB}"/>
               </a:ext>
             </a:extLst>
           </p:cNvPr>
@@ -8178,7 +8220,7 @@
           <p:cNvPr id="19" name="Rectangle 18">
             <a:extLst>
               <a:ext uri="{FF2B5EF4-FFF2-40B4-BE49-F238E27FC236}">
-                <a16:creationId xmlns="" xmlns:a16="http://schemas.microsoft.com/office/drawing/2014/main" id="{74579293-52E5-4310-8CF9-CB2152F107E7}"/>
+                <a16:creationId xmlns:a16="http://schemas.microsoft.com/office/drawing/2014/main" xmlns="" id="{74579293-52E5-4310-8CF9-CB2152F107E7}"/>
               </a:ext>
             </a:extLst>
           </p:cNvPr>
@@ -8230,7 +8272,7 @@
           <p:cNvPr id="20" name="ZoneTexte 19">
             <a:extLst>
               <a:ext uri="{FF2B5EF4-FFF2-40B4-BE49-F238E27FC236}">
-                <a16:creationId xmlns="" xmlns:a16="http://schemas.microsoft.com/office/drawing/2014/main" id="{025AAE5F-8033-452C-99BB-A99CBABE00C3}"/>
+                <a16:creationId xmlns:a16="http://schemas.microsoft.com/office/drawing/2014/main" xmlns="" id="{025AAE5F-8033-452C-99BB-A99CBABE00C3}"/>
               </a:ext>
             </a:extLst>
           </p:cNvPr>
@@ -8563,6 +8605,13 @@
   <p:clrMapOvr>
     <a:masterClrMapping/>
   </p:clrMapOvr>
+  <p:timing>
+    <p:tnLst>
+      <p:par>
+        <p:cTn id="1" dur="indefinite" restart="never" nodeType="tmRoot"/>
+      </p:par>
+    </p:tnLst>
+  </p:timing>
 </p:sld>
 </file>
 
@@ -8588,7 +8637,7 @@
           <p:cNvPr id="2" name="Titre 1">
             <a:extLst>
               <a:ext uri="{FF2B5EF4-FFF2-40B4-BE49-F238E27FC236}">
-                <a16:creationId xmlns="" xmlns:a16="http://schemas.microsoft.com/office/drawing/2014/main" id="{91BA4A39-1F6B-484F-8841-239672C1383A}"/>
+                <a16:creationId xmlns:a16="http://schemas.microsoft.com/office/drawing/2014/main" xmlns="" id="{91BA4A39-1F6B-484F-8841-239672C1383A}"/>
               </a:ext>
             </a:extLst>
           </p:cNvPr>
@@ -8629,7 +8678,7 @@
           <p:cNvPr id="4" name="Espace réservé du numéro de diapositive 3">
             <a:extLst>
               <a:ext uri="{FF2B5EF4-FFF2-40B4-BE49-F238E27FC236}">
-                <a16:creationId xmlns="" xmlns:a16="http://schemas.microsoft.com/office/drawing/2014/main" id="{D25E7812-697C-41CD-B280-961DF666C306}"/>
+                <a16:creationId xmlns:a16="http://schemas.microsoft.com/office/drawing/2014/main" xmlns="" id="{D25E7812-697C-41CD-B280-961DF666C306}"/>
               </a:ext>
             </a:extLst>
           </p:cNvPr>
@@ -8658,7 +8707,7 @@
           <p:cNvPr id="5" name="Espace réservé du contenu 4">
             <a:extLst>
               <a:ext uri="{FF2B5EF4-FFF2-40B4-BE49-F238E27FC236}">
-                <a16:creationId xmlns="" xmlns:a16="http://schemas.microsoft.com/office/drawing/2014/main" id="{86AD883B-E7F3-4EFE-87FA-E9DB0AB8FA29}"/>
+                <a16:creationId xmlns:a16="http://schemas.microsoft.com/office/drawing/2014/main" xmlns="" id="{86AD883B-E7F3-4EFE-87FA-E9DB0AB8FA29}"/>
               </a:ext>
             </a:extLst>
           </p:cNvPr>
@@ -8696,7 +8745,7 @@
           <p:cNvPr id="6" name="Espace réservé du contenu 4">
             <a:extLst>
               <a:ext uri="{FF2B5EF4-FFF2-40B4-BE49-F238E27FC236}">
-                <a16:creationId xmlns="" xmlns:a16="http://schemas.microsoft.com/office/drawing/2014/main" id="{0515C748-0FA2-48FA-82BF-FC48BD64E878}"/>
+                <a16:creationId xmlns:a16="http://schemas.microsoft.com/office/drawing/2014/main" xmlns="" id="{0515C748-0FA2-48FA-82BF-FC48BD64E878}"/>
               </a:ext>
             </a:extLst>
           </p:cNvPr>
@@ -8732,7 +8781,7 @@
           <p:cNvPr id="8" name="Espace réservé du contenu 4">
             <a:extLst>
               <a:ext uri="{FF2B5EF4-FFF2-40B4-BE49-F238E27FC236}">
-                <a16:creationId xmlns="" xmlns:a16="http://schemas.microsoft.com/office/drawing/2014/main" id="{67474B78-B82B-4AB6-B7FE-EB7B9BCF26C5}"/>
+                <a16:creationId xmlns:a16="http://schemas.microsoft.com/office/drawing/2014/main" xmlns="" id="{67474B78-B82B-4AB6-B7FE-EB7B9BCF26C5}"/>
               </a:ext>
             </a:extLst>
           </p:cNvPr>
@@ -8853,6 +8902,13 @@
   <p:clrMapOvr>
     <a:masterClrMapping/>
   </p:clrMapOvr>
+  <p:timing>
+    <p:tnLst>
+      <p:par>
+        <p:cTn id="1" dur="indefinite" restart="never" nodeType="tmRoot"/>
+      </p:par>
+    </p:tnLst>
+  </p:timing>
 </p:sld>
 </file>
 
@@ -9083,6 +9139,13 @@
   <p:clrMapOvr>
     <a:masterClrMapping/>
   </p:clrMapOvr>
+  <p:timing>
+    <p:tnLst>
+      <p:par>
+        <p:cTn id="1" dur="indefinite" restart="never" nodeType="tmRoot"/>
+      </p:par>
+    </p:tnLst>
+  </p:timing>
 </p:sld>
 </file>
 
@@ -9108,7 +9171,7 @@
           <p:cNvPr id="2" name="Titre 1">
             <a:extLst>
               <a:ext uri="{FF2B5EF4-FFF2-40B4-BE49-F238E27FC236}">
-                <a16:creationId xmlns="" xmlns:a16="http://schemas.microsoft.com/office/drawing/2014/main" id="{B10C7138-8451-4B69-A7C8-063D44BF58DD}"/>
+                <a16:creationId xmlns:a16="http://schemas.microsoft.com/office/drawing/2014/main" xmlns="" id="{B10C7138-8451-4B69-A7C8-063D44BF58DD}"/>
               </a:ext>
             </a:extLst>
           </p:cNvPr>
@@ -9150,7 +9213,7 @@
           <p:cNvPr id="4" name="Espace réservé du numéro de diapositive 3">
             <a:extLst>
               <a:ext uri="{FF2B5EF4-FFF2-40B4-BE49-F238E27FC236}">
-                <a16:creationId xmlns="" xmlns:a16="http://schemas.microsoft.com/office/drawing/2014/main" id="{ECADF3E0-C33D-4BC8-9AC9-7355E10E7DA2}"/>
+                <a16:creationId xmlns:a16="http://schemas.microsoft.com/office/drawing/2014/main" xmlns="" id="{ECADF3E0-C33D-4BC8-9AC9-7355E10E7DA2}"/>
               </a:ext>
             </a:extLst>
           </p:cNvPr>
@@ -9178,7 +9241,7 @@
           <p:cNvPr id="5" name="Tableau 5">
             <a:extLst>
               <a:ext uri="{FF2B5EF4-FFF2-40B4-BE49-F238E27FC236}">
-                <a16:creationId xmlns="" xmlns:a16="http://schemas.microsoft.com/office/drawing/2014/main" id="{061D8ECD-4504-480E-B863-8E51D691108C}"/>
+                <a16:creationId xmlns:a16="http://schemas.microsoft.com/office/drawing/2014/main" xmlns="" id="{061D8ECD-4504-480E-B863-8E51D691108C}"/>
               </a:ext>
             </a:extLst>
           </p:cNvPr>
@@ -9188,14 +9251,14 @@
           <p:nvPr>
             <p:extLst>
               <p:ext uri="{D42A27DB-BD31-4B8C-83A1-F6EECF244321}">
-                <p14:modId xmlns:p14="http://schemas.microsoft.com/office/powerpoint/2010/main" val="1139935258"/>
+                <p14:modId xmlns:p14="http://schemas.microsoft.com/office/powerpoint/2010/main" val="178196483"/>
               </p:ext>
             </p:extLst>
           </p:nvPr>
         </p:nvGraphicFramePr>
         <p:xfrm>
           <a:off x="1867127" y="2045971"/>
-          <a:ext cx="8128000" cy="2016760"/>
+          <a:ext cx="8128000" cy="2656840"/>
         </p:xfrm>
         <a:graphic>
           <a:graphicData uri="http://schemas.openxmlformats.org/drawingml/2006/table">
@@ -9207,14 +9270,14 @@
                 <a:gridCol w="4064000">
                   <a:extLst>
                     <a:ext uri="{9D8B030D-6E8A-4147-A177-3AD203B41FA5}">
-                      <a16:colId xmlns="" xmlns:a16="http://schemas.microsoft.com/office/drawing/2014/main" val="3234099670"/>
+                      <a16:colId xmlns:a16="http://schemas.microsoft.com/office/drawing/2014/main" xmlns="" val="3234099670"/>
                     </a:ext>
                   </a:extLst>
                 </a:gridCol>
                 <a:gridCol w="4064000">
                   <a:extLst>
                     <a:ext uri="{9D8B030D-6E8A-4147-A177-3AD203B41FA5}">
-                      <a16:colId xmlns="" xmlns:a16="http://schemas.microsoft.com/office/drawing/2014/main" val="4047801045"/>
+                      <a16:colId xmlns:a16="http://schemas.microsoft.com/office/drawing/2014/main" xmlns="" val="4047801045"/>
                     </a:ext>
                   </a:extLst>
                 </a:gridCol>
@@ -9260,7 +9323,7 @@
                 </a:tc>
                 <a:extLst>
                   <a:ext uri="{0D108BD9-81ED-4DB2-BD59-A6C34878D82A}">
-                    <a16:rowId xmlns="" xmlns:a16="http://schemas.microsoft.com/office/drawing/2014/main" val="781607035"/>
+                    <a16:rowId xmlns:a16="http://schemas.microsoft.com/office/drawing/2014/main" xmlns="" val="781607035"/>
                   </a:ext>
                 </a:extLst>
               </a:tr>
@@ -9271,13 +9334,22 @@
                     <a:lstStyle/>
                     <a:p>
                       <a:r>
+                        <a:rPr lang="fr-FR" sz="1800" kern="1200" dirty="0" smtClean="0">
+                          <a:solidFill>
+                            <a:schemeClr val="dk1"/>
+                          </a:solidFill>
+                          <a:effectLst/>
+                        </a:rPr>
+                        <a:t>acheter </a:t>
+                      </a:r>
+                      <a:r>
                         <a:rPr lang="fr-FR" sz="1800" kern="1200" dirty="0">
                           <a:solidFill>
                             <a:schemeClr val="dk1"/>
                           </a:solidFill>
                           <a:effectLst/>
                         </a:rPr>
-                        <a:t>Acheter un Shield Wifi </a:t>
+                        <a:t>un Shield Wifi </a:t>
                       </a:r>
                       <a:r>
                         <a:rPr lang="fr-FR" sz="1800" kern="1200" dirty="0" err="1">
@@ -9323,7 +9395,7 @@
                 </a:tc>
                 <a:extLst>
                   <a:ext uri="{0D108BD9-81ED-4DB2-BD59-A6C34878D82A}">
-                    <a16:rowId xmlns="" xmlns:a16="http://schemas.microsoft.com/office/drawing/2014/main" val="2984840049"/>
+                    <a16:rowId xmlns:a16="http://schemas.microsoft.com/office/drawing/2014/main" xmlns="" val="2984840049"/>
                   </a:ext>
                 </a:extLst>
               </a:tr>
@@ -9394,7 +9466,7 @@
                 </a:tc>
                 <a:extLst>
                   <a:ext uri="{0D108BD9-81ED-4DB2-BD59-A6C34878D82A}">
-                    <a16:rowId xmlns="" xmlns:a16="http://schemas.microsoft.com/office/drawing/2014/main" val="3011804741"/>
+                    <a16:rowId xmlns:a16="http://schemas.microsoft.com/office/drawing/2014/main" xmlns="" val="3011804741"/>
                   </a:ext>
                 </a:extLst>
               </a:tr>
@@ -9425,11 +9497,15 @@
                     <a:p>
                       <a:r>
                         <a:rPr lang="fr-FR" dirty="0" smtClean="0"/>
-                        <a:t>Paramétrer</a:t>
+                        <a:t>paramétrer</a:t>
                       </a:r>
                       <a:r>
                         <a:rPr lang="fr-FR" baseline="0" dirty="0" smtClean="0"/>
-                        <a:t> le contenu des mails sur l’</a:t>
+                        <a:t> </a:t>
+                      </a:r>
+                      <a:r>
+                        <a:rPr lang="fr-FR" baseline="0" dirty="0" smtClean="0"/>
+                        <a:t>le contenu des mails sur l’</a:t>
                       </a:r>
                       <a:r>
                         <a:rPr lang="fr-FR" dirty="0" smtClean="0"/>
@@ -9442,9 +9518,39 @@
                 </a:tc>
                 <a:extLst>
                   <a:ext uri="{0D108BD9-81ED-4DB2-BD59-A6C34878D82A}">
-                    <a16:rowId xmlns="" xmlns:a16="http://schemas.microsoft.com/office/drawing/2014/main" val="3888602602"/>
+                    <a16:rowId xmlns:a16="http://schemas.microsoft.com/office/drawing/2014/main" xmlns="" val="3888602602"/>
                   </a:ext>
                 </a:extLst>
+              </a:tr>
+              <a:tr h="370840">
+                <a:tc>
+                  <a:txBody>
+                    <a:bodyPr/>
+                    <a:lstStyle/>
+                    <a:p>
+                      <a:endParaRPr lang="fr-FR" dirty="0"/>
+                    </a:p>
+                  </a:txBody>
+                  <a:tcPr/>
+                </a:tc>
+                <a:tc>
+                  <a:txBody>
+                    <a:bodyPr/>
+                    <a:lstStyle/>
+                    <a:p>
+                      <a:r>
+                        <a:rPr lang="fr-FR" dirty="0" smtClean="0"/>
+                        <a:t>mettre</a:t>
+                      </a:r>
+                      <a:r>
+                        <a:rPr lang="fr-FR" baseline="0" dirty="0" smtClean="0"/>
+                        <a:t> en œuvre l’algorithme de détection des gaz</a:t>
+                      </a:r>
+                      <a:endParaRPr lang="fr-FR" dirty="0"/>
+                    </a:p>
+                  </a:txBody>
+                  <a:tcPr/>
+                </a:tc>
               </a:tr>
             </a:tbl>
           </a:graphicData>
@@ -9460,6 +9566,13 @@
   <p:clrMapOvr>
     <a:masterClrMapping/>
   </p:clrMapOvr>
+  <p:timing>
+    <p:tnLst>
+      <p:par>
+        <p:cTn id="1" dur="indefinite" restart="never" nodeType="tmRoot"/>
+      </p:par>
+    </p:tnLst>
+  </p:timing>
 </p:sld>
 </file>
 

</xml_diff>